<commit_message>
Bug fix, and tested with gtsam develop branch
</commit_message>
<xml_diff>
--- a/FactorGraph.pptx
+++ b/FactorGraph.pptx
@@ -104,6 +104,11 @@
       </a:defRPr>
     </a:lvl9pPr>
   </p:defaultTextStyle>
+  <p:extLst>
+    <p:ext uri="{EFAFB233-063F-42B5-8137-9DF3F51BA10A}">
+      <p15:sldGuideLst xmlns:p15="http://schemas.microsoft.com/office/powerpoint/2012/main"/>
+    </p:ext>
+  </p:extLst>
 </p:presentation>
 </file>
 
@@ -3323,6 +3328,55 @@
       </p:grpSpPr>
       <p:sp>
         <p:nvSpPr>
+          <p:cNvPr id="4" name="Rectangle 3">
+            <a:extLst>
+              <a:ext uri="{FF2B5EF4-FFF2-40B4-BE49-F238E27FC236}">
+                <a16:creationId xmlns:a16="http://schemas.microsoft.com/office/drawing/2014/main" id="{D29A97E6-07E8-4E9D-AE3A-3E685E00E891}"/>
+              </a:ext>
+            </a:extLst>
+          </p:cNvPr>
+          <p:cNvSpPr/>
+          <p:nvPr/>
+        </p:nvSpPr>
+        <p:spPr>
+          <a:xfrm>
+            <a:off x="1276864" y="397475"/>
+            <a:ext cx="8196648" cy="6063049"/>
+          </a:xfrm>
+          <a:prstGeom prst="rect">
+            <a:avLst/>
+          </a:prstGeom>
+          <a:solidFill>
+            <a:schemeClr val="tx1"/>
+          </a:solidFill>
+        </p:spPr>
+        <p:style>
+          <a:lnRef idx="2">
+            <a:schemeClr val="accent1">
+              <a:shade val="50000"/>
+            </a:schemeClr>
+          </a:lnRef>
+          <a:fillRef idx="1">
+            <a:schemeClr val="accent1"/>
+          </a:fillRef>
+          <a:effectRef idx="0">
+            <a:schemeClr val="accent1"/>
+          </a:effectRef>
+          <a:fontRef idx="minor">
+            <a:schemeClr val="lt1"/>
+          </a:fontRef>
+        </p:style>
+        <p:txBody>
+          <a:bodyPr rtlCol="0" anchor="ctr"/>
+          <a:lstStyle/>
+          <a:p>
+            <a:pPr algn="ctr"/>
+            <a:endParaRPr lang="en-US" b="1"/>
+          </a:p>
+        </p:txBody>
+      </p:sp>
+      <p:sp>
+        <p:nvSpPr>
           <p:cNvPr id="2" name="Oval 1">
             <a:extLst>
               <a:ext uri="{FF2B5EF4-FFF2-40B4-BE49-F238E27FC236}">
@@ -3344,7 +3398,7 @@
           <a:noFill/>
           <a:ln>
             <a:solidFill>
-              <a:schemeClr val="tx1"/>
+              <a:schemeClr val="bg1"/>
             </a:solidFill>
           </a:ln>
         </p:spPr>
@@ -3370,9 +3424,9 @@
           <a:p>
             <a:pPr algn="ctr"/>
             <a:r>
-              <a:rPr lang="en-US" sz="1400" dirty="0">
+              <a:rPr lang="en-US" sz="1400" b="1" dirty="0">
                 <a:solidFill>
-                  <a:schemeClr val="tx1"/>
+                  <a:schemeClr val="bg1"/>
                 </a:solidFill>
               </a:rPr>
               <a:t>Hook</a:t>
@@ -3403,7 +3457,7 @@
           <a:noFill/>
           <a:ln>
             <a:solidFill>
-              <a:schemeClr val="tx1"/>
+              <a:schemeClr val="bg1"/>
             </a:solidFill>
           </a:ln>
         </p:spPr>
@@ -3428,9 +3482,9 @@
           <a:lstStyle/>
           <a:p>
             <a:pPr algn="ctr"/>
-            <a:endParaRPr lang="en-US" sz="1400">
+            <a:endParaRPr lang="en-US" sz="1400" b="1">
               <a:solidFill>
-                <a:schemeClr val="tx1"/>
+                <a:schemeClr val="bg1"/>
               </a:solidFill>
             </a:endParaRPr>
           </a:p>
@@ -3462,7 +3516,7 @@
           </a:prstGeom>
           <a:ln w="19050">
             <a:solidFill>
-              <a:schemeClr val="tx1"/>
+              <a:schemeClr val="bg1"/>
             </a:solidFill>
           </a:ln>
         </p:spPr>
@@ -3504,7 +3558,7 @@
           <a:noFill/>
           <a:ln>
             <a:solidFill>
-              <a:schemeClr val="tx1"/>
+              <a:schemeClr val="bg1"/>
             </a:solidFill>
           </a:ln>
         </p:spPr>
@@ -3530,9 +3584,9 @@
           <a:p>
             <a:pPr algn="ctr"/>
             <a:r>
-              <a:rPr lang="en-US" sz="1400" dirty="0">
+              <a:rPr lang="en-US" sz="1400" b="1" dirty="0">
                 <a:solidFill>
-                  <a:schemeClr val="tx1"/>
+                  <a:schemeClr val="bg1"/>
                 </a:solidFill>
               </a:rPr>
               <a:t>X0</a:t>
@@ -3563,7 +3617,7 @@
           <a:noFill/>
           <a:ln>
             <a:solidFill>
-              <a:schemeClr val="tx1"/>
+              <a:schemeClr val="bg1"/>
             </a:solidFill>
           </a:ln>
         </p:spPr>
@@ -3589,9 +3643,9 @@
           <a:p>
             <a:pPr algn="ctr"/>
             <a:r>
-              <a:rPr lang="en-US" sz="1400" dirty="0">
+              <a:rPr lang="en-US" sz="1400" b="1" dirty="0">
                 <a:solidFill>
-                  <a:schemeClr val="tx1"/>
+                  <a:schemeClr val="bg1"/>
                 </a:solidFill>
               </a:rPr>
               <a:t>X1</a:t>
@@ -3622,7 +3676,7 @@
           <a:noFill/>
           <a:ln>
             <a:solidFill>
-              <a:schemeClr val="tx1"/>
+              <a:schemeClr val="bg1"/>
             </a:solidFill>
           </a:ln>
         </p:spPr>
@@ -3648,9 +3702,9 @@
           <a:p>
             <a:pPr algn="ctr"/>
             <a:r>
-              <a:rPr lang="en-US" sz="1400" dirty="0">
+              <a:rPr lang="en-US" sz="1400" b="1" dirty="0">
                 <a:solidFill>
-                  <a:schemeClr val="tx1"/>
+                  <a:schemeClr val="bg1"/>
                 </a:solidFill>
               </a:rPr>
               <a:t>X2</a:t>
@@ -3681,7 +3735,7 @@
           <a:noFill/>
           <a:ln>
             <a:solidFill>
-              <a:schemeClr val="tx1"/>
+              <a:schemeClr val="bg1"/>
             </a:solidFill>
           </a:ln>
         </p:spPr>
@@ -3706,9 +3760,9 @@
           <a:lstStyle/>
           <a:p>
             <a:pPr algn="ctr"/>
-            <a:endParaRPr lang="en-US" sz="1400">
+            <a:endParaRPr lang="en-US" sz="1400" b="1">
               <a:solidFill>
-                <a:schemeClr val="tx1"/>
+                <a:schemeClr val="bg1"/>
               </a:solidFill>
             </a:endParaRPr>
           </a:p>
@@ -3737,7 +3791,7 @@
           <a:noFill/>
           <a:ln>
             <a:solidFill>
-              <a:schemeClr val="tx1"/>
+              <a:schemeClr val="bg1"/>
             </a:solidFill>
           </a:ln>
         </p:spPr>
@@ -3762,9 +3816,9 @@
           <a:lstStyle/>
           <a:p>
             <a:pPr algn="ctr"/>
-            <a:endParaRPr lang="en-US" sz="1400">
+            <a:endParaRPr lang="en-US" sz="1400" b="1">
               <a:solidFill>
-                <a:schemeClr val="tx1"/>
+                <a:schemeClr val="bg1"/>
               </a:solidFill>
             </a:endParaRPr>
           </a:p>
@@ -3793,7 +3847,7 @@
           <a:noFill/>
           <a:ln>
             <a:solidFill>
-              <a:schemeClr val="tx1"/>
+              <a:schemeClr val="bg1"/>
             </a:solidFill>
           </a:ln>
         </p:spPr>
@@ -3818,9 +3872,9 @@
           <a:lstStyle/>
           <a:p>
             <a:pPr algn="ctr"/>
-            <a:endParaRPr lang="en-US" sz="1400">
+            <a:endParaRPr lang="en-US" sz="1400" b="1">
               <a:solidFill>
-                <a:schemeClr val="tx1"/>
+                <a:schemeClr val="bg1"/>
               </a:solidFill>
             </a:endParaRPr>
           </a:p>
@@ -3852,7 +3906,7 @@
           </a:prstGeom>
           <a:ln w="19050">
             <a:solidFill>
-              <a:schemeClr val="tx1"/>
+              <a:schemeClr val="bg1"/>
             </a:solidFill>
           </a:ln>
         </p:spPr>
@@ -3897,7 +3951,7 @@
           </a:prstGeom>
           <a:ln w="19050">
             <a:solidFill>
-              <a:schemeClr val="tx1"/>
+              <a:schemeClr val="bg1"/>
             </a:solidFill>
           </a:ln>
         </p:spPr>
@@ -3939,7 +3993,7 @@
           <a:noFill/>
           <a:ln>
             <a:solidFill>
-              <a:schemeClr val="tx1"/>
+              <a:schemeClr val="bg1"/>
             </a:solidFill>
           </a:ln>
         </p:spPr>
@@ -3964,9 +4018,9 @@
           <a:lstStyle/>
           <a:p>
             <a:pPr algn="ctr"/>
-            <a:endParaRPr lang="en-US" sz="1400">
+            <a:endParaRPr lang="en-US" sz="1400" b="1">
               <a:solidFill>
-                <a:schemeClr val="tx1"/>
+                <a:schemeClr val="bg1"/>
               </a:solidFill>
             </a:endParaRPr>
           </a:p>
@@ -3995,7 +4049,7 @@
           <a:noFill/>
           <a:ln>
             <a:solidFill>
-              <a:schemeClr val="tx1"/>
+              <a:schemeClr val="bg1"/>
             </a:solidFill>
           </a:ln>
         </p:spPr>
@@ -4020,9 +4074,9 @@
           <a:lstStyle/>
           <a:p>
             <a:pPr algn="ctr"/>
-            <a:endParaRPr lang="en-US" sz="1400">
+            <a:endParaRPr lang="en-US" sz="1400" b="1">
               <a:solidFill>
-                <a:schemeClr val="tx1"/>
+                <a:schemeClr val="bg1"/>
               </a:solidFill>
             </a:endParaRPr>
           </a:p>
@@ -4054,7 +4108,7 @@
           </a:prstGeom>
           <a:ln w="19050">
             <a:solidFill>
-              <a:schemeClr val="tx1"/>
+              <a:schemeClr val="bg1"/>
             </a:solidFill>
           </a:ln>
         </p:spPr>
@@ -4099,7 +4153,7 @@
           </a:prstGeom>
           <a:ln w="19050">
             <a:solidFill>
-              <a:schemeClr val="tx1"/>
+              <a:schemeClr val="bg1"/>
             </a:solidFill>
           </a:ln>
         </p:spPr>
@@ -4141,7 +4195,7 @@
           <a:noFill/>
           <a:ln>
             <a:solidFill>
-              <a:schemeClr val="tx1"/>
+              <a:schemeClr val="bg1"/>
             </a:solidFill>
           </a:ln>
         </p:spPr>
@@ -4166,9 +4220,9 @@
           <a:lstStyle/>
           <a:p>
             <a:pPr algn="ctr"/>
-            <a:endParaRPr lang="en-US" sz="1400">
+            <a:endParaRPr lang="en-US" sz="1400" b="1">
               <a:solidFill>
-                <a:schemeClr val="tx1"/>
+                <a:schemeClr val="bg1"/>
               </a:solidFill>
             </a:endParaRPr>
           </a:p>
@@ -4197,7 +4251,7 @@
           <a:noFill/>
           <a:ln>
             <a:solidFill>
-              <a:schemeClr val="tx1"/>
+              <a:schemeClr val="bg1"/>
             </a:solidFill>
           </a:ln>
         </p:spPr>
@@ -4222,9 +4276,9 @@
           <a:lstStyle/>
           <a:p>
             <a:pPr algn="ctr"/>
-            <a:endParaRPr lang="en-US" sz="1400">
+            <a:endParaRPr lang="en-US" sz="1400" b="1">
               <a:solidFill>
-                <a:schemeClr val="tx1"/>
+                <a:schemeClr val="bg1"/>
               </a:solidFill>
             </a:endParaRPr>
           </a:p>
@@ -4256,7 +4310,7 @@
           </a:prstGeom>
           <a:ln w="19050">
             <a:solidFill>
-              <a:schemeClr val="tx1"/>
+              <a:schemeClr val="bg1"/>
             </a:solidFill>
           </a:ln>
         </p:spPr>
@@ -4301,7 +4355,7 @@
           </a:prstGeom>
           <a:ln w="19050">
             <a:solidFill>
-              <a:schemeClr val="tx1"/>
+              <a:schemeClr val="bg1"/>
             </a:solidFill>
           </a:ln>
         </p:spPr>
@@ -4346,7 +4400,7 @@
           </a:prstGeom>
           <a:ln w="19050">
             <a:solidFill>
-              <a:schemeClr val="tx1"/>
+              <a:schemeClr val="bg1"/>
             </a:solidFill>
           </a:ln>
         </p:spPr>
@@ -4391,7 +4445,7 @@
           </a:prstGeom>
           <a:ln w="19050">
             <a:solidFill>
-              <a:schemeClr val="tx1"/>
+              <a:schemeClr val="bg1"/>
             </a:solidFill>
           </a:ln>
         </p:spPr>
@@ -4436,7 +4490,7 @@
           </a:prstGeom>
           <a:ln w="19050">
             <a:solidFill>
-              <a:schemeClr val="tx1"/>
+              <a:schemeClr val="bg1"/>
             </a:solidFill>
           </a:ln>
         </p:spPr>
@@ -4481,7 +4535,7 @@
           </a:prstGeom>
           <a:ln w="19050">
             <a:solidFill>
-              <a:schemeClr val="tx1"/>
+              <a:schemeClr val="bg1"/>
             </a:solidFill>
           </a:ln>
         </p:spPr>
@@ -4526,7 +4580,7 @@
           </a:prstGeom>
           <a:ln w="19050">
             <a:solidFill>
-              <a:schemeClr val="tx1"/>
+              <a:schemeClr val="bg1"/>
             </a:solidFill>
           </a:ln>
         </p:spPr>

</xml_diff>